<commit_message>
Fixed sound, modified pplanks, etc.
</commit_message>
<xml_diff>
--- a/Game_Delivery_3.pptx
+++ b/Game_Delivery_3.pptx
@@ -26469,7 +26469,7 @@
             </a:pPr>
             <a:r>
               <a:rPr lang="en" dirty="0"/>
-              <a:t>ZAPSLAT</a:t>
+              <a:t>ZAPSLAT &amp; Free Stock Music</a:t>
             </a:r>
             <a:endParaRPr dirty="0"/>
           </a:p>
@@ -26689,8 +26689,53 @@
         </p:blipFill>
         <p:spPr bwMode="auto">
           <a:xfrm>
-            <a:off x="4858029" y="1910904"/>
+            <a:off x="4815575" y="2279008"/>
             <a:ext cx="3175000" cy="1111250"/>
+          </a:xfrm>
+          <a:prstGeom prst="rect">
+            <a:avLst/>
+          </a:prstGeom>
+          <a:noFill/>
+          <a:extLst>
+            <a:ext uri="{909E8E84-426E-40DD-AFC4-6F175D3DCCD1}">
+              <a14:hiddenFill xmlns:a14="http://schemas.microsoft.com/office/drawing/2010/main">
+                <a:solidFill>
+                  <a:srgbClr val="FFFFFF"/>
+                </a:solidFill>
+              </a14:hiddenFill>
+            </a:ext>
+          </a:extLst>
+        </p:spPr>
+      </p:pic>
+      <p:pic>
+        <p:nvPicPr>
+          <p:cNvPr id="3" name="Picture 4" descr="Elevate your video: 5 stock music sites that have what you need">
+            <a:extLst>
+              <a:ext uri="{FF2B5EF4-FFF2-40B4-BE49-F238E27FC236}">
+                <a16:creationId xmlns:a16="http://schemas.microsoft.com/office/drawing/2014/main" id="{1ADC01C7-A52B-7C88-F322-DC4547E6AB0F}"/>
+              </a:ext>
+            </a:extLst>
+          </p:cNvPr>
+          <p:cNvPicPr>
+            <a:picLocks noChangeAspect="1" noChangeArrowheads="1"/>
+          </p:cNvPicPr>
+          <p:nvPr/>
+        </p:nvPicPr>
+        <p:blipFill rotWithShape="1">
+          <a:blip r:embed="rId5">
+            <a:extLst>
+              <a:ext uri="{28A0092B-C50C-407E-A947-70E740481C1C}">
+                <a14:useLocalDpi xmlns:a14="http://schemas.microsoft.com/office/drawing/2010/main" val="0"/>
+              </a:ext>
+            </a:extLst>
+          </a:blip>
+          <a:srcRect l="5023" t="43105" r="4844" b="41426"/>
+          <a:stretch/>
+        </p:blipFill>
+        <p:spPr bwMode="auto">
+          <a:xfrm>
+            <a:off x="4700614" y="1575942"/>
+            <a:ext cx="3375332" cy="579267"/>
           </a:xfrm>
           <a:prstGeom prst="rect">
             <a:avLst/>

</xml_diff>

<commit_message>
last commit i hope
</commit_message>
<xml_diff>
--- a/Game_Delivery_3.pptx
+++ b/Game_Delivery_3.pptx
@@ -26445,7 +26445,7 @@
         </p:nvSpPr>
         <p:spPr>
           <a:xfrm>
-            <a:off x="5002130" y="3458072"/>
+            <a:off x="5002130" y="3512936"/>
             <a:ext cx="2772300" cy="503700"/>
           </a:xfrm>
           <a:prstGeom prst="rect">
@@ -26689,7 +26689,7 @@
         </p:blipFill>
         <p:spPr bwMode="auto">
           <a:xfrm>
-            <a:off x="4815575" y="2279008"/>
+            <a:off x="4815575" y="2233288"/>
             <a:ext cx="3175000" cy="1111250"/>
           </a:xfrm>
           <a:prstGeom prst="rect">
@@ -28181,83 +28181,13 @@
             </a:pPr>
             <a:r>
               <a:rPr lang="en-CA" dirty="0"/>
-              <a:t>Level_8</a:t>
-            </a:r>
-          </a:p>
-          <a:p>
-            <a:pPr marL="285750" lvl="0" indent="-285750" algn="l" rtl="0">
-              <a:spcBef>
-                <a:spcPts val="0"/>
-              </a:spcBef>
-              <a:spcAft>
-                <a:spcPts val="1600"/>
-              </a:spcAft>
-              <a:buFont typeface="Wingdings" pitchFamily="2" charset="2"/>
-              <a:buChar char="Ø"/>
-            </a:pPr>
-            <a:r>
-              <a:rPr lang="en-CA" dirty="0"/>
-              <a:t>(Finished) Context</a:t>
-            </a:r>
-          </a:p>
-          <a:p>
-            <a:pPr marL="285750" lvl="0" indent="-285750" algn="l" rtl="0">
-              <a:spcBef>
-                <a:spcPts val="0"/>
-              </a:spcBef>
-              <a:spcAft>
-                <a:spcPts val="1600"/>
-              </a:spcAft>
-              <a:buFont typeface="Wingdings" pitchFamily="2" charset="2"/>
-              <a:buChar char="Ø"/>
-            </a:pPr>
-            <a:r>
-              <a:rPr lang="en-CA" dirty="0"/>
-              <a:t>(Finished) </a:t>
+              <a:t>Level</a:t>
             </a:r>
             <a:r>
-              <a:rPr lang="en-CA" dirty="0" err="1"/>
-              <a:t>Zapper_Dialogue</a:t>
+              <a:rPr lang="en-CA"/>
+              <a:t>_8</a:t>
             </a:r>
             <a:endParaRPr lang="en-CA" dirty="0"/>
-          </a:p>
-          <a:p>
-            <a:pPr marL="285750" lvl="0" indent="-285750" algn="l" rtl="0">
-              <a:spcBef>
-                <a:spcPts val="0"/>
-              </a:spcBef>
-              <a:spcAft>
-                <a:spcPts val="1600"/>
-              </a:spcAft>
-              <a:buFont typeface="Wingdings" pitchFamily="2" charset="2"/>
-              <a:buChar char="Ø"/>
-            </a:pPr>
-            <a:r>
-              <a:rPr lang="en-CA" dirty="0"/>
-              <a:t>(Finished) </a:t>
-            </a:r>
-            <a:r>
-              <a:rPr lang="en-CA" dirty="0" err="1"/>
-              <a:t>Boss_And_Fangs_Dialogue</a:t>
-            </a:r>
-            <a:endParaRPr lang="en-CA" dirty="0"/>
-          </a:p>
-          <a:p>
-            <a:pPr marL="285750" lvl="0" indent="-285750" algn="l" rtl="0">
-              <a:spcBef>
-                <a:spcPts val="0"/>
-              </a:spcBef>
-              <a:spcAft>
-                <a:spcPts val="1600"/>
-              </a:spcAft>
-              <a:buFont typeface="Wingdings" pitchFamily="2" charset="2"/>
-              <a:buChar char="Ø"/>
-            </a:pPr>
-            <a:r>
-              <a:rPr lang="en-CA" dirty="0" err="1"/>
-              <a:t>Game_Won</a:t>
-            </a:r>
-            <a:endParaRPr dirty="0"/>
           </a:p>
         </p:txBody>
       </p:sp>
@@ -30826,7 +30756,7 @@
         <p:spPr>
           <a:xfrm>
             <a:off x="678797" y="1191661"/>
-            <a:ext cx="3499800" cy="3970318"/>
+            <a:ext cx="3499800" cy="3693319"/>
           </a:xfrm>
           <a:prstGeom prst="rect">
             <a:avLst/>
@@ -30967,27 +30897,6 @@
                 <a:latin typeface="Nunito"/>
               </a:rPr>
               <a:t>Arielle_Dialogue</a:t>
-            </a:r>
-            <a:endParaRPr lang="en-CA" sz="1800" dirty="0">
-              <a:solidFill>
-                <a:schemeClr val="accent5"/>
-              </a:solidFill>
-              <a:latin typeface="Nunito"/>
-            </a:endParaRPr>
-          </a:p>
-          <a:p>
-            <a:pPr marL="285750" lvl="0" indent="-285750">
-              <a:buFont typeface="Wingdings" pitchFamily="2" charset="2"/>
-              <a:buChar char="Ø"/>
-            </a:pPr>
-            <a:r>
-              <a:rPr lang="en-CA" sz="1800" dirty="0" err="1">
-                <a:solidFill>
-                  <a:schemeClr val="accent5"/>
-                </a:solidFill>
-                <a:latin typeface="Nunito"/>
-              </a:rPr>
-              <a:t>Fangs_And_Boss_Dialogue</a:t>
             </a:r>
             <a:endParaRPr lang="en-CA" sz="1800" dirty="0">
               <a:solidFill>

</xml_diff>